<commit_message>
Update 3. The differences between Public, Private and Hybrid cloud models.pptx
</commit_message>
<xml_diff>
--- a/content/Azure Fundamentals/1. Understand cloud concepts/3. The differences between Public, Private and Hybrid cloud models.pptx
+++ b/content/Azure Fundamentals/1. Understand cloud concepts/3. The differences between Public, Private and Hybrid cloud models.pptx
@@ -17338,13 +17338,56 @@
             <a:off x="1524000" y="3428999"/>
             <a:ext cx="9144000" cy="926663"/>
           </a:xfrm>
+          <a:gradFill flip="none" rotWithShape="1">
+            <a:gsLst>
+              <a:gs pos="0">
+                <a:schemeClr val="accent5">
+                  <a:lumMod val="67000"/>
+                </a:schemeClr>
+              </a:gs>
+              <a:gs pos="48000">
+                <a:schemeClr val="accent5">
+                  <a:lumMod val="97000"/>
+                  <a:lumOff val="3000"/>
+                </a:schemeClr>
+              </a:gs>
+              <a:gs pos="100000">
+                <a:schemeClr val="accent5">
+                  <a:lumMod val="60000"/>
+                  <a:lumOff val="40000"/>
+                </a:schemeClr>
+              </a:gs>
+            </a:gsLst>
+            <a:lin ang="16200000" scaled="1"/>
+            <a:tileRect/>
+          </a:gradFill>
+          <a:ln>
+            <a:noFill/>
+          </a:ln>
         </p:spPr>
+        <p:style>
+          <a:lnRef idx="0">
+            <a:scrgbClr r="0" g="0" b="0"/>
+          </a:lnRef>
+          <a:fillRef idx="0">
+            <a:scrgbClr r="0" g="0" b="0"/>
+          </a:fillRef>
+          <a:effectRef idx="0">
+            <a:scrgbClr r="0" g="0" b="0"/>
+          </a:effectRef>
+          <a:fontRef idx="minor">
+            <a:schemeClr val="lt1"/>
+          </a:fontRef>
+        </p:style>
         <p:txBody>
           <a:bodyPr/>
           <a:lstStyle/>
           <a:p>
             <a:r>
-              <a:rPr lang="en-US" dirty="0"/>
+              <a:rPr lang="en-US" dirty="0">
+                <a:latin typeface="Segoe UI" panose="020B0502040204020203" pitchFamily="34" charset="0"/>
+                <a:cs typeface="Segoe UI" panose="020B0502040204020203" pitchFamily="34" charset="0"/>
+              </a:rPr>
               <a:t>Public, Private and Hybrid</a:t>
             </a:r>
           </a:p>
@@ -17372,24 +17415,47 @@
             <a:ext cx="9144000" cy="1655762"/>
           </a:xfrm>
         </p:spPr>
+        <p:style>
+          <a:lnRef idx="0">
+            <a:schemeClr val="accent5"/>
+          </a:lnRef>
+          <a:fillRef idx="3">
+            <a:schemeClr val="accent5"/>
+          </a:fillRef>
+          <a:effectRef idx="3">
+            <a:schemeClr val="accent5"/>
+          </a:effectRef>
+          <a:fontRef idx="minor">
+            <a:schemeClr val="lt1"/>
+          </a:fontRef>
+        </p:style>
         <p:txBody>
           <a:bodyPr/>
           <a:lstStyle/>
           <a:p>
             <a:r>
-              <a:rPr lang="en-US" dirty="0"/>
+              <a:rPr lang="en-US" dirty="0">
+                <a:latin typeface="Segoe UI" panose="020B0502040204020203" pitchFamily="34" charset="0"/>
+                <a:cs typeface="Segoe UI" panose="020B0502040204020203" pitchFamily="34" charset="0"/>
+              </a:rPr>
               <a:t>The differences between Public, Private and Hybrid cloud models</a:t>
             </a:r>
           </a:p>
           <a:p>
             <a:r>
-              <a:rPr lang="en-US" dirty="0"/>
+              <a:rPr lang="en-US" dirty="0">
+                <a:latin typeface="Segoe UI" panose="020B0502040204020203" pitchFamily="34" charset="0"/>
+                <a:cs typeface="Segoe UI" panose="020B0502040204020203" pitchFamily="34" charset="0"/>
+              </a:rPr>
               <a:t>Warren du Toit &amp; Matthew Levy</a:t>
             </a:r>
           </a:p>
           <a:p>
             <a:r>
-              <a:rPr lang="en-US" dirty="0"/>
+              <a:rPr lang="en-US" dirty="0">
+                <a:latin typeface="Segoe UI" panose="020B0502040204020203" pitchFamily="34" charset="0"/>
+                <a:cs typeface="Segoe UI" panose="020B0502040204020203" pitchFamily="34" charset="0"/>
+              </a:rPr>
               <a:t>Azure MVP &amp; Enterprise Mobility MVP</a:t>
             </a:r>
           </a:p>

</xml_diff>